<commit_message>
bit more of half a presentation kinda
</commit_message>
<xml_diff>
--- a/Heist powerpoint.pptx
+++ b/Heist powerpoint.pptx
@@ -9,6 +9,7 @@
     <p:sldId id="257" r:id="rId3"/>
     <p:sldId id="259" r:id="rId4"/>
     <p:sldId id="258" r:id="rId5"/>
+    <p:sldId id="260" r:id="rId6"/>
   </p:sldIdLst>
   <p:sldSz cx="12192000" cy="6858000"/>
   <p:notesSz cx="6858000" cy="9144000"/>
@@ -12582,11 +12583,7 @@
           <a:p>
             <a:r>
               <a:rPr lang="en-GB" dirty="0" smtClean="0"/>
-              <a:t>Using a mixture of items the player has purchased during the pre-planning phase, and various items found scattered throughout the bank, the character must find a way to complete the tasks and final </a:t>
-            </a:r>
-            <a:r>
-              <a:rPr lang="en-GB" smtClean="0"/>
-              <a:t>goal efficiently.</a:t>
+              <a:t>Using a mixture of items the player has purchased during the pre-planning phase, and various items found scattered throughout the bank, the character must find a way to complete the tasks and final goal efficiently.</a:t>
             </a:r>
             <a:endParaRPr lang="en-GB" dirty="0"/>
           </a:p>
@@ -12784,7 +12781,9 @@
         </p:nvSpPr>
         <p:spPr/>
         <p:txBody>
-          <a:bodyPr/>
+          <a:bodyPr>
+            <a:normAutofit fontScale="92500" lnSpcReduction="10000"/>
+          </a:bodyPr>
           <a:lstStyle/>
           <a:p>
             <a:r>
@@ -12801,14 +12800,26 @@
           <a:p>
             <a:r>
               <a:rPr lang="en-GB" dirty="0" smtClean="0"/>
-              <a:t>?</a:t>
+              <a:t>Two main stages to the game: the “pre-planning”, and the “main body.” The reason for this is to create a sense of realism, and it will hopefully engage the player, as they are not simply handed the tools required for an easy victory. The limit on items you are able to choose and carry adds a sense of strategy to the game, rather than mindless movement around a map. </a:t>
             </a:r>
           </a:p>
           <a:p>
             <a:r>
-              <a:rPr lang="en-GB" dirty="0"/>
-              <a:t>?</a:t>
+              <a:rPr lang="en-GB" dirty="0" smtClean="0"/>
+              <a:t>Attributes </a:t>
             </a:r>
+          </a:p>
+          <a:p>
+            <a:r>
+              <a:rPr lang="en-GB" dirty="0" smtClean="0"/>
+              <a:t>A leader board that will be ranked according to how much money you are able to steal from the bank. This means that the game can be played through multiple times, so that you can try to beat your personal best.</a:t>
+            </a:r>
+          </a:p>
+          <a:p>
+            <a:endParaRPr lang="en-GB" dirty="0" smtClean="0"/>
+          </a:p>
+          <a:p>
+            <a:endParaRPr lang="en-GB" dirty="0"/>
           </a:p>
         </p:txBody>
       </p:sp>
@@ -12816,6 +12827,108 @@
     <p:extLst>
       <p:ext uri="{BB962C8B-B14F-4D97-AF65-F5344CB8AC3E}">
         <p14:creationId xmlns:p14="http://schemas.microsoft.com/office/powerpoint/2010/main" val="4203257141"/>
+      </p:ext>
+    </p:extLst>
+  </p:cSld>
+  <p:clrMapOvr>
+    <a:masterClrMapping/>
+  </p:clrMapOvr>
+</p:sld>
+</file>
+
+<file path=ppt/slides/slide5.xml><?xml version="1.0" encoding="utf-8"?>
+<p:sld xmlns:a="http://schemas.openxmlformats.org/drawingml/2006/main" xmlns:r="http://schemas.openxmlformats.org/officeDocument/2006/relationships" xmlns:p="http://schemas.openxmlformats.org/presentationml/2006/main">
+  <p:cSld>
+    <p:spTree>
+      <p:nvGrpSpPr>
+        <p:cNvPr id="1" name=""/>
+        <p:cNvGrpSpPr/>
+        <p:nvPr/>
+      </p:nvGrpSpPr>
+      <p:grpSpPr>
+        <a:xfrm>
+          <a:off x="0" y="0"/>
+          <a:ext cx="0" cy="0"/>
+          <a:chOff x="0" y="0"/>
+          <a:chExt cx="0" cy="0"/>
+        </a:xfrm>
+      </p:grpSpPr>
+      <p:sp>
+        <p:nvSpPr>
+          <p:cNvPr id="2" name="Title 1"/>
+          <p:cNvSpPr>
+            <a:spLocks noGrp="1"/>
+          </p:cNvSpPr>
+          <p:nvPr>
+            <p:ph type="title"/>
+          </p:nvPr>
+        </p:nvSpPr>
+        <p:spPr/>
+        <p:txBody>
+          <a:bodyPr/>
+          <a:lstStyle/>
+          <a:p>
+            <a:r>
+              <a:rPr lang="en-GB" dirty="0" smtClean="0">
+                <a:solidFill>
+                  <a:schemeClr val="accent2">
+                    <a:lumMod val="20000"/>
+                    <a:lumOff val="80000"/>
+                  </a:schemeClr>
+                </a:solidFill>
+              </a:rPr>
+              <a:t>Why should you choose this game?</a:t>
+            </a:r>
+            <a:endParaRPr lang="en-GB" dirty="0">
+              <a:solidFill>
+                <a:schemeClr val="accent2">
+                  <a:lumMod val="20000"/>
+                  <a:lumOff val="80000"/>
+                </a:schemeClr>
+              </a:solidFill>
+            </a:endParaRPr>
+          </a:p>
+        </p:txBody>
+      </p:sp>
+      <p:sp>
+        <p:nvSpPr>
+          <p:cNvPr id="3" name="Content Placeholder 2"/>
+          <p:cNvSpPr>
+            <a:spLocks noGrp="1"/>
+          </p:cNvSpPr>
+          <p:nvPr>
+            <p:ph idx="1"/>
+          </p:nvPr>
+        </p:nvSpPr>
+        <p:spPr/>
+        <p:txBody>
+          <a:bodyPr/>
+          <a:lstStyle/>
+          <a:p>
+            <a:r>
+              <a:rPr lang="en-GB" dirty="0" smtClean="0"/>
+              <a:t>If you are looking for a game with an exciting story, with the freedom to affect the outcome depending on your personal decisions, then this is the game for you!</a:t>
+            </a:r>
+          </a:p>
+          <a:p>
+            <a:r>
+              <a:rPr lang="en-GB" dirty="0" smtClean="0"/>
+              <a:t>Heist takes the stereotypical text-based adventure game format, but spices it up with the use of a modern, and somewhat realistic setting, alongside characters you can empathise with.</a:t>
+            </a:r>
+          </a:p>
+          <a:p>
+            <a:r>
+              <a:rPr lang="en-GB" dirty="0" smtClean="0"/>
+              <a:t>Do you think you could carry out a successful bank heist? The only way to find out is to try this game!</a:t>
+            </a:r>
+            <a:endParaRPr lang="en-GB" dirty="0"/>
+          </a:p>
+        </p:txBody>
+      </p:sp>
+    </p:spTree>
+    <p:extLst>
+      <p:ext uri="{BB962C8B-B14F-4D97-AF65-F5344CB8AC3E}">
+        <p14:creationId xmlns:p14="http://schemas.microsoft.com/office/powerpoint/2010/main" val="201225546"/>
       </p:ext>
     </p:extLst>
   </p:cSld>

</xml_diff>